<commit_message>
Update Twitter hate detection.pptx
</commit_message>
<xml_diff>
--- a/Twitter hate detection.pptx
+++ b/Twitter hate detection.pptx
@@ -13151,12 +13151,80 @@
           <a:chExt cx="0" cy="0"/>
         </a:xfrm>
       </p:grpSpPr>
+      <p:sp>
+        <p:nvSpPr>
+          <p:cNvPr id="2" name="Title 1">
+            <a:extLst>
+              <a:ext uri="{FF2B5EF4-FFF2-40B4-BE49-F238E27FC236}">
+                <a16:creationId xmlns:a16="http://schemas.microsoft.com/office/drawing/2014/main" id="{D9B36C10-A9EA-414E-B3D3-09BAD9FA950D}"/>
+              </a:ext>
+            </a:extLst>
+          </p:cNvPr>
+          <p:cNvSpPr>
+            <a:spLocks noGrp="1"/>
+          </p:cNvSpPr>
+          <p:nvPr>
+            <p:ph type="title"/>
+          </p:nvPr>
+        </p:nvSpPr>
+        <p:spPr>
+          <a:xfrm>
+            <a:off x="520697" y="1040001"/>
+            <a:ext cx="3338625" cy="3150159"/>
+          </a:xfrm>
+        </p:spPr>
+        <p:txBody>
+          <a:bodyPr>
+            <a:normAutofit/>
+          </a:bodyPr>
+          <a:lstStyle/>
+          <a:p>
+            <a:r>
+              <a:rPr lang="en-US" dirty="0"/>
+              <a:t>Twitter hate detection</a:t>
+            </a:r>
+          </a:p>
+        </p:txBody>
+      </p:sp>
+      <p:sp>
+        <p:nvSpPr>
+          <p:cNvPr id="3" name="Subtitle 2">
+            <a:extLst>
+              <a:ext uri="{FF2B5EF4-FFF2-40B4-BE49-F238E27FC236}">
+                <a16:creationId xmlns:a16="http://schemas.microsoft.com/office/drawing/2014/main" id="{0A140D27-0E15-4434-A8B8-FC32761449B0}"/>
+              </a:ext>
+            </a:extLst>
+          </p:cNvPr>
+          <p:cNvSpPr>
+            <a:spLocks noGrp="1"/>
+          </p:cNvSpPr>
+          <p:nvPr>
+            <p:ph type="body" sz="quarter" idx="14"/>
+          </p:nvPr>
+        </p:nvSpPr>
+        <p:spPr>
+          <a:xfrm>
+            <a:off x="490538" y="4240213"/>
+            <a:ext cx="3497262" cy="1801812"/>
+          </a:xfrm>
+        </p:spPr>
+        <p:txBody>
+          <a:bodyPr/>
+          <a:lstStyle/>
+          <a:p>
+            <a:r>
+              <a:rPr lang="en-US" dirty="0"/>
+              <a:t>Sathana Ramesh </a:t>
+            </a:r>
+          </a:p>
+        </p:txBody>
+      </p:sp>
       <p:pic>
         <p:nvPicPr>
-          <p:cNvPr id="6" name="Picture Placeholder 5" descr="A low angle view of buildings in a city">
-            <a:extLst>
-              <a:ext uri="{FF2B5EF4-FFF2-40B4-BE49-F238E27FC236}">
-                <a16:creationId xmlns:a16="http://schemas.microsoft.com/office/drawing/2014/main" id="{3CF2725B-8BAD-4651-8A3F-80E73387133C}"/>
+          <p:cNvPr id="12" name="Picture Placeholder 11">
+            <a:extLst>
+              <a:ext uri="{FF2B5EF4-FFF2-40B4-BE49-F238E27FC236}">
+                <a16:creationId xmlns:a16="http://schemas.microsoft.com/office/drawing/2014/main" id="{6C46DA18-E22C-8E45-6211-7EFCFB453587}"/>
               </a:ext>
             </a:extLst>
           </p:cNvPr>
@@ -13168,14 +13236,8 @@
           </p:nvPr>
         </p:nvPicPr>
         <p:blipFill rotWithShape="1">
-          <a:blip r:embed="rId2" cstate="screen">
-            <a:extLst>
-              <a:ext uri="{28A0092B-C50C-407E-A947-70E740481C1C}">
-                <a14:useLocalDpi xmlns:a14="http://schemas.microsoft.com/office/drawing/2010/main"/>
-              </a:ext>
-            </a:extLst>
-          </a:blip>
-          <a:srcRect/>
+          <a:blip r:embed="rId2"/>
+          <a:srcRect l="-1657" t="4447" r="1657"/>
           <a:stretch/>
         </p:blipFill>
         <p:spPr>
@@ -13185,74 +13247,6 @@
           </a:xfrm>
         </p:spPr>
       </p:pic>
-      <p:sp>
-        <p:nvSpPr>
-          <p:cNvPr id="2" name="Title 1">
-            <a:extLst>
-              <a:ext uri="{FF2B5EF4-FFF2-40B4-BE49-F238E27FC236}">
-                <a16:creationId xmlns:a16="http://schemas.microsoft.com/office/drawing/2014/main" id="{D9B36C10-A9EA-414E-B3D3-09BAD9FA950D}"/>
-              </a:ext>
-            </a:extLst>
-          </p:cNvPr>
-          <p:cNvSpPr>
-            <a:spLocks noGrp="1"/>
-          </p:cNvSpPr>
-          <p:nvPr>
-            <p:ph type="title"/>
-          </p:nvPr>
-        </p:nvSpPr>
-        <p:spPr>
-          <a:xfrm>
-            <a:off x="520697" y="1040001"/>
-            <a:ext cx="3338625" cy="3150159"/>
-          </a:xfrm>
-        </p:spPr>
-        <p:txBody>
-          <a:bodyPr>
-            <a:normAutofit/>
-          </a:bodyPr>
-          <a:lstStyle/>
-          <a:p>
-            <a:r>
-              <a:rPr lang="en-US" dirty="0"/>
-              <a:t>Twitter hate detection</a:t>
-            </a:r>
-          </a:p>
-        </p:txBody>
-      </p:sp>
-      <p:sp>
-        <p:nvSpPr>
-          <p:cNvPr id="3" name="Subtitle 2">
-            <a:extLst>
-              <a:ext uri="{FF2B5EF4-FFF2-40B4-BE49-F238E27FC236}">
-                <a16:creationId xmlns:a16="http://schemas.microsoft.com/office/drawing/2014/main" id="{0A140D27-0E15-4434-A8B8-FC32761449B0}"/>
-              </a:ext>
-            </a:extLst>
-          </p:cNvPr>
-          <p:cNvSpPr>
-            <a:spLocks noGrp="1"/>
-          </p:cNvSpPr>
-          <p:nvPr>
-            <p:ph type="body" sz="quarter" idx="14"/>
-          </p:nvPr>
-        </p:nvSpPr>
-        <p:spPr>
-          <a:xfrm>
-            <a:off x="490538" y="4240213"/>
-            <a:ext cx="3497262" cy="1801812"/>
-          </a:xfrm>
-        </p:spPr>
-        <p:txBody>
-          <a:bodyPr/>
-          <a:lstStyle/>
-          <a:p>
-            <a:r>
-              <a:rPr lang="en-US" dirty="0"/>
-              <a:t>Sathana Ramesh </a:t>
-            </a:r>
-          </a:p>
-        </p:txBody>
-      </p:sp>
     </p:spTree>
     <p:extLst>
       <p:ext uri="{BB962C8B-B14F-4D97-AF65-F5344CB8AC3E}">
@@ -14287,40 +14281,6 @@
           </a:p>
         </p:txBody>
       </p:sp>
-      <p:pic>
-        <p:nvPicPr>
-          <p:cNvPr id="6" name="Picture Placeholder 5" descr="A view of a bridge from below">
-            <a:extLst>
-              <a:ext uri="{FF2B5EF4-FFF2-40B4-BE49-F238E27FC236}">
-                <a16:creationId xmlns:a16="http://schemas.microsoft.com/office/drawing/2014/main" id="{610B39E1-AAA7-4199-8B7C-D12DD364E6D7}"/>
-              </a:ext>
-            </a:extLst>
-          </p:cNvPr>
-          <p:cNvPicPr>
-            <a:picLocks noGrp="1" noChangeAspect="1"/>
-          </p:cNvPicPr>
-          <p:nvPr>
-            <p:ph type="pic" sz="quarter" idx="13"/>
-          </p:nvPr>
-        </p:nvPicPr>
-        <p:blipFill rotWithShape="1">
-          <a:blip r:embed="rId2" cstate="screen">
-            <a:extLst>
-              <a:ext uri="{28A0092B-C50C-407E-A947-70E740481C1C}">
-                <a14:useLocalDpi xmlns:a14="http://schemas.microsoft.com/office/drawing/2010/main"/>
-              </a:ext>
-            </a:extLst>
-          </a:blip>
-          <a:srcRect/>
-          <a:stretch/>
-        </p:blipFill>
-        <p:spPr>
-          <a:xfrm>
-            <a:off x="0" y="-7444"/>
-            <a:ext cx="4966447" cy="6846394"/>
-          </a:xfrm>
-        </p:spPr>
-      </p:pic>
       <p:sp>
         <p:nvSpPr>
           <p:cNvPr id="35" name="Footer Placeholder 2">
@@ -14390,7 +14350,7 @@
           <a:p>
             <a:r>
               <a:rPr lang="en-US" dirty="0">
-                <a:hlinkClick r:id="rId3"/>
+                <a:hlinkClick r:id="rId2"/>
               </a:rPr>
               <a:t>https://github.com/SathanaR/capstone-project</a:t>
             </a:r>
@@ -14466,6 +14426,36 @@
           </a:p>
         </p:txBody>
       </p:sp>
+      <p:pic>
+        <p:nvPicPr>
+          <p:cNvPr id="10" name="Picture Placeholder 9">
+            <a:extLst>
+              <a:ext uri="{FF2B5EF4-FFF2-40B4-BE49-F238E27FC236}">
+                <a16:creationId xmlns:a16="http://schemas.microsoft.com/office/drawing/2014/main" id="{7BBEB432-69F2-8E54-5E16-8222EE3FEB44}"/>
+              </a:ext>
+            </a:extLst>
+          </p:cNvPr>
+          <p:cNvPicPr>
+            <a:picLocks noGrp="1" noChangeAspect="1"/>
+          </p:cNvPicPr>
+          <p:nvPr>
+            <p:ph type="pic" sz="quarter" idx="13"/>
+          </p:nvPr>
+        </p:nvPicPr>
+        <p:blipFill>
+          <a:blip r:embed="rId3"/>
+          <a:srcRect l="28061" r="28061"/>
+          <a:stretch>
+            <a:fillRect/>
+          </a:stretch>
+        </p:blipFill>
+        <p:spPr>
+          <a:xfrm>
+            <a:off x="0" y="-82391"/>
+            <a:ext cx="4966447" cy="6846394"/>
+          </a:xfrm>
+        </p:spPr>
+      </p:pic>
     </p:spTree>
     <p:extLst>
       <p:ext uri="{BB962C8B-B14F-4D97-AF65-F5344CB8AC3E}">
@@ -15252,6 +15242,15 @@
 </file>
 
 <file path=customXml/item2.xml><?xml version="1.0" encoding="utf-8"?>
+<?mso-contentType ?>
+<FormTemplates xmlns="http://schemas.microsoft.com/sharepoint/v3/contenttype/forms">
+  <Display>DocumentLibraryForm</Display>
+  <Edit>DocumentLibraryForm</Edit>
+  <New>DocumentLibraryForm</New>
+</FormTemplates>
+</file>
+
+<file path=customXml/item3.xml><?xml version="1.0" encoding="utf-8"?>
 <p:properties xmlns:p="http://schemas.microsoft.com/office/2006/metadata/properties" xmlns:xsi="http://www.w3.org/2001/XMLSchema-instance" xmlns:pc="http://schemas.microsoft.com/office/infopath/2007/PartnerControls">
   <documentManagement>
     <Status xmlns="71af3243-3dd4-4a8d-8c0d-dd76da1f02a5">Not started</Status>
@@ -15268,15 +15267,6 @@
     <MediaServiceKeyPoints xmlns="71af3243-3dd4-4a8d-8c0d-dd76da1f02a5" xsi:nil="true"/>
   </documentManagement>
 </p:properties>
-</file>
-
-<file path=customXml/item3.xml><?xml version="1.0" encoding="utf-8"?>
-<?mso-contentType ?>
-<FormTemplates xmlns="http://schemas.microsoft.com/sharepoint/v3/contenttype/forms">
-  <Display>DocumentLibraryForm</Display>
-  <Edit>DocumentLibraryForm</Edit>
-  <New>DocumentLibraryForm</New>
-</FormTemplates>
 </file>
 
 <file path=customXml/itemProps1.xml><?xml version="1.0" encoding="utf-8"?>
@@ -15301,6 +15291,14 @@
 </file>
 
 <file path=customXml/itemProps2.xml><?xml version="1.0" encoding="utf-8"?>
+<ds:datastoreItem xmlns:ds="http://schemas.openxmlformats.org/officeDocument/2006/customXml" ds:itemID="{207C1F5B-A1D0-429A-8E7C-3E271353D1E0}">
+  <ds:schemaRefs>
+    <ds:schemaRef ds:uri="http://schemas.microsoft.com/sharepoint/v3/contenttype/forms"/>
+  </ds:schemaRefs>
+</ds:datastoreItem>
+</file>
+
+<file path=customXml/itemProps3.xml><?xml version="1.0" encoding="utf-8"?>
 <ds:datastoreItem xmlns:ds="http://schemas.openxmlformats.org/officeDocument/2006/customXml" ds:itemID="{B15CABE4-909F-4611-A0E1-6E45080B3C9E}">
   <ds:schemaRefs>
     <ds:schemaRef ds:uri="http://schemas.microsoft.com/office/2006/metadata/properties"/>
@@ -15312,14 +15310,6 @@
 </ds:datastoreItem>
 </file>
 
-<file path=customXml/itemProps3.xml><?xml version="1.0" encoding="utf-8"?>
-<ds:datastoreItem xmlns:ds="http://schemas.openxmlformats.org/officeDocument/2006/customXml" ds:itemID="{207C1F5B-A1D0-429A-8E7C-3E271353D1E0}">
-  <ds:schemaRefs>
-    <ds:schemaRef ds:uri="http://schemas.microsoft.com/sharepoint/v3/contenttype/forms"/>
-  </ds:schemaRefs>
-</ds:datastoreItem>
-</file>
-
 <file path=docMetadata/LabelInfo.xml><?xml version="1.0" encoding="utf-8"?>
 <clbl:labelList xmlns:clbl="http://schemas.microsoft.com/office/2020/mipLabelMetadata">
   <clbl:label id="{f42aa342-8706-4288-bd11-ebb85995028c}" enabled="1" method="Standard" siteId="{72f988bf-86f1-41af-91ab-2d7cd011db47}" contentBits="0" removed="0"/>

</xml_diff>